<commit_message>
edited presentation, not final yet
</commit_message>
<xml_diff>
--- a/LiveHWDeterminantSolver.pptx
+++ b/LiveHWDeterminantSolver.pptx
@@ -15,7 +15,8 @@
     <p:sldId id="263" r:id="rId9"/>
     <p:sldId id="264" r:id="rId10"/>
     <p:sldId id="266" r:id="rId11"/>
-    <p:sldId id="265" r:id="rId12"/>
+    <p:sldId id="267" r:id="rId12"/>
+    <p:sldId id="268" r:id="rId13"/>
   </p:sldIdLst>
   <p:sldSz cx="9144000" cy="6858000" type="screen4x3"/>
   <p:notesSz cx="6858000" cy="9144000"/>
@@ -291,7 +292,7 @@
             <a:fld id="{F70E79F8-0BD4-4E9D-96FE-0DFF0CED3CC9}" type="datetimeFigureOut">
               <a:rPr lang="en-US" smtClean="0"/>
               <a:pPr/>
-              <a:t>14-Dec-15</a:t>
+              <a:t>16-Dec-15</a:t>
             </a:fld>
             <a:endParaRPr lang="en-US"/>
           </a:p>
@@ -458,7 +459,7 @@
             <a:fld id="{F70E79F8-0BD4-4E9D-96FE-0DFF0CED3CC9}" type="datetimeFigureOut">
               <a:rPr lang="en-US" smtClean="0"/>
               <a:pPr/>
-              <a:t>14-Dec-15</a:t>
+              <a:t>16-Dec-15</a:t>
             </a:fld>
             <a:endParaRPr lang="en-US"/>
           </a:p>
@@ -635,7 +636,7 @@
             <a:fld id="{F70E79F8-0BD4-4E9D-96FE-0DFF0CED3CC9}" type="datetimeFigureOut">
               <a:rPr lang="en-US" smtClean="0"/>
               <a:pPr/>
-              <a:t>14-Dec-15</a:t>
+              <a:t>16-Dec-15</a:t>
             </a:fld>
             <a:endParaRPr lang="en-US"/>
           </a:p>
@@ -802,7 +803,7 @@
             <a:fld id="{F70E79F8-0BD4-4E9D-96FE-0DFF0CED3CC9}" type="datetimeFigureOut">
               <a:rPr lang="en-US" smtClean="0"/>
               <a:pPr/>
-              <a:t>14-Dec-15</a:t>
+              <a:t>16-Dec-15</a:t>
             </a:fld>
             <a:endParaRPr lang="en-US"/>
           </a:p>
@@ -1046,7 +1047,7 @@
             <a:fld id="{F70E79F8-0BD4-4E9D-96FE-0DFF0CED3CC9}" type="datetimeFigureOut">
               <a:rPr lang="en-US" smtClean="0"/>
               <a:pPr/>
-              <a:t>14-Dec-15</a:t>
+              <a:t>16-Dec-15</a:t>
             </a:fld>
             <a:endParaRPr lang="en-US"/>
           </a:p>
@@ -1312,7 +1313,7 @@
             <a:fld id="{F70E79F8-0BD4-4E9D-96FE-0DFF0CED3CC9}" type="datetimeFigureOut">
               <a:rPr lang="en-US" smtClean="0"/>
               <a:pPr/>
-              <a:t>14-Dec-15</a:t>
+              <a:t>16-Dec-15</a:t>
             </a:fld>
             <a:endParaRPr lang="en-US"/>
           </a:p>
@@ -1692,7 +1693,7 @@
             <a:fld id="{F70E79F8-0BD4-4E9D-96FE-0DFF0CED3CC9}" type="datetimeFigureOut">
               <a:rPr lang="en-US" smtClean="0"/>
               <a:pPr/>
-              <a:t>14-Dec-15</a:t>
+              <a:t>16-Dec-15</a:t>
             </a:fld>
             <a:endParaRPr lang="en-US"/>
           </a:p>
@@ -1844,7 +1845,7 @@
             <a:fld id="{F70E79F8-0BD4-4E9D-96FE-0DFF0CED3CC9}" type="datetimeFigureOut">
               <a:rPr lang="en-US" smtClean="0"/>
               <a:pPr/>
-              <a:t>14-Dec-15</a:t>
+              <a:t>16-Dec-15</a:t>
             </a:fld>
             <a:endParaRPr lang="en-US"/>
           </a:p>
@@ -1936,7 +1937,7 @@
             <a:fld id="{F70E79F8-0BD4-4E9D-96FE-0DFF0CED3CC9}" type="datetimeFigureOut">
               <a:rPr lang="en-US" smtClean="0"/>
               <a:pPr/>
-              <a:t>14-Dec-15</a:t>
+              <a:t>16-Dec-15</a:t>
             </a:fld>
             <a:endParaRPr lang="en-US"/>
           </a:p>
@@ -2199,7 +2200,7 @@
             <a:fld id="{F70E79F8-0BD4-4E9D-96FE-0DFF0CED3CC9}" type="datetimeFigureOut">
               <a:rPr lang="en-US" smtClean="0"/>
               <a:pPr/>
-              <a:t>14-Dec-15</a:t>
+              <a:t>16-Dec-15</a:t>
             </a:fld>
             <a:endParaRPr lang="en-US"/>
           </a:p>
@@ -2489,7 +2490,7 @@
             <a:fld id="{F70E79F8-0BD4-4E9D-96FE-0DFF0CED3CC9}" type="datetimeFigureOut">
               <a:rPr lang="en-US" smtClean="0"/>
               <a:pPr/>
-              <a:t>14-Dec-15</a:t>
+              <a:t>16-Dec-15</a:t>
             </a:fld>
             <a:endParaRPr lang="en-US"/>
           </a:p>
@@ -3262,7 +3263,7 @@
             <a:fld id="{F70E79F8-0BD4-4E9D-96FE-0DFF0CED3CC9}" type="datetimeFigureOut">
               <a:rPr lang="en-US" smtClean="0"/>
               <a:pPr/>
-              <a:t>14-Dec-15</a:t>
+              <a:t>16-Dec-15</a:t>
             </a:fld>
             <a:endParaRPr lang="en-US"/>
           </a:p>
@@ -4109,12 +4110,12 @@
         <p:spPr>
           <a:xfrm>
             <a:off x="457200" y="1935480"/>
-            <a:ext cx="8229600" cy="4160520"/>
+            <a:ext cx="8229600" cy="4770120"/>
           </a:xfrm>
         </p:spPr>
         <p:txBody>
           <a:bodyPr>
-            <a:normAutofit/>
+            <a:normAutofit lnSpcReduction="10000"/>
           </a:bodyPr>
           <a:lstStyle/>
           <a:p>
@@ -4122,21 +4123,24 @@
               <a:rPr lang="sr-Latn-RS" dirty="0" smtClean="0">
                 <a:latin typeface="+mj-lt"/>
               </a:rPr>
-              <a:t>Ono što je u okviru projekta predmed nauke i gde postoje različita rešenja jeste prepoznavanje cifara.</a:t>
-            </a:r>
-          </a:p>
-          <a:p>
+              <a:t>Ono što je u okviru projekta predmed nauke i gde postoje različita rešenja jeste prepoznavanje cifara</a:t>
+            </a:r>
             <a:r>
               <a:rPr lang="sr-Latn-RS" dirty="0" smtClean="0">
                 <a:latin typeface="+mj-lt"/>
               </a:rPr>
-              <a:t>Za klasifikaciju ručno napisanog oblika u odgovarajuću cifru koriste se sledeći klasifikatori:</a:t>
-            </a:r>
+              <a:t>. Ispod su navedena neka od rešenja (svaka ima raznih modifikacija i parametrizacija) i određeni procenat grešaka koji je ustanovljen na kompetentnim test primerima.</a:t>
+            </a:r>
+            <a:endParaRPr lang="sr-Latn-RS" dirty="0" smtClean="0">
+              <a:latin typeface="+mj-lt"/>
+            </a:endParaRPr>
+          </a:p>
+          <a:p>
             <a:r>
               <a:rPr lang="sr-Latn-RS" dirty="0" smtClean="0">
                 <a:latin typeface="+mj-lt"/>
               </a:rPr>
-              <a:t> </a:t>
+              <a:t>Za klasifikaciju ručno napisanog oblika u odgovarajuću cifru koriste se sledeći klasifikatori: </a:t>
             </a:r>
           </a:p>
           <a:p>
@@ -4145,8 +4149,17 @@
               <a:rPr lang="sr-Latn-RS" dirty="0" smtClean="0">
                 <a:latin typeface="+mj-lt"/>
               </a:rPr>
-              <a:t>Linearni klasifikator</a:t>
-            </a:r>
+              <a:t>Linearni </a:t>
+            </a:r>
+            <a:r>
+              <a:rPr lang="sr-Latn-RS" dirty="0" smtClean="0">
+                <a:latin typeface="+mj-lt"/>
+              </a:rPr>
+              <a:t>klasifikator – 8.4%</a:t>
+            </a:r>
+            <a:endParaRPr lang="sr-Latn-RS" dirty="0" smtClean="0">
+              <a:latin typeface="+mj-lt"/>
+            </a:endParaRPr>
           </a:p>
           <a:p>
             <a:pPr lvl="1"/>
@@ -4154,8 +4167,17 @@
               <a:rPr lang="sr-Latn-RS" dirty="0" smtClean="0">
                 <a:latin typeface="+mj-lt"/>
               </a:rPr>
-              <a:t>Nearest neighbor klasifikator (k-NN)</a:t>
-            </a:r>
+              <a:t>Nearest neighbor klasifikator (k-NN</a:t>
+            </a:r>
+            <a:r>
+              <a:rPr lang="sr-Latn-RS" dirty="0" smtClean="0">
+                <a:latin typeface="+mj-lt"/>
+              </a:rPr>
+              <a:t>) – 1.1% err</a:t>
+            </a:r>
+            <a:endParaRPr lang="sr-Latn-RS" dirty="0" smtClean="0">
+              <a:latin typeface="+mj-lt"/>
+            </a:endParaRPr>
           </a:p>
           <a:p>
             <a:pPr lvl="1"/>
@@ -4163,8 +4185,17 @@
               <a:rPr lang="sr-Latn-RS" dirty="0" smtClean="0">
                 <a:latin typeface="+mj-lt"/>
               </a:rPr>
-              <a:t>Polinomni klasifikator</a:t>
-            </a:r>
+              <a:t>Polinomni </a:t>
+            </a:r>
+            <a:r>
+              <a:rPr lang="sr-Latn-RS" dirty="0" smtClean="0">
+                <a:latin typeface="+mj-lt"/>
+              </a:rPr>
+              <a:t>klasifikator – 3.3%</a:t>
+            </a:r>
+            <a:endParaRPr lang="sr-Latn-RS" dirty="0" smtClean="0">
+              <a:latin typeface="+mj-lt"/>
+            </a:endParaRPr>
           </a:p>
           <a:p>
             <a:pPr lvl="1"/>
@@ -4172,7 +4203,22 @@
               <a:rPr lang="sr-Latn-RS" dirty="0" smtClean="0">
                 <a:latin typeface="+mj-lt"/>
               </a:rPr>
-              <a:t>Neuronske mreže</a:t>
+              <a:t>Neuronske </a:t>
+            </a:r>
+            <a:r>
+              <a:rPr lang="sr-Latn-RS" dirty="0" smtClean="0">
+                <a:latin typeface="+mj-lt"/>
+              </a:rPr>
+              <a:t>mreže – 0.2%</a:t>
+            </a:r>
+          </a:p>
+          <a:p>
+            <a:pPr lvl="1"/>
+            <a:r>
+              <a:rPr lang="sr-Latn-RS" dirty="0" smtClean="0">
+                <a:latin typeface="+mj-lt"/>
+              </a:rPr>
+              <a:t>Soft Margin klasifikator (Support Vector Machine) – 1.1%</a:t>
             </a:r>
             <a:endParaRPr lang="en-US" dirty="0">
               <a:latin typeface="+mj-lt"/>
@@ -4215,18 +4261,30 @@
             <p:ph type="title"/>
           </p:nvPr>
         </p:nvSpPr>
-        <p:spPr/>
-        <p:txBody>
-          <a:bodyPr/>
-          <a:lstStyle/>
-          <a:p>
-            <a:endParaRPr lang="en-US"/>
-          </a:p>
-        </p:txBody>
-      </p:sp>
-      <p:sp>
-        <p:nvSpPr>
-          <p:cNvPr id="3" name="Content Placeholder 2"/>
+        <p:spPr>
+          <a:xfrm>
+            <a:off x="457200" y="609600"/>
+            <a:ext cx="8229600" cy="932688"/>
+          </a:xfrm>
+        </p:spPr>
+        <p:txBody>
+          <a:bodyPr>
+            <a:normAutofit/>
+          </a:bodyPr>
+          <a:lstStyle/>
+          <a:p>
+            <a:pPr marL="514350" indent="-514350" algn="ctr"/>
+            <a:r>
+              <a:rPr lang="sr-Latn-RS" sz="4800" b="1" dirty="0" smtClean="0"/>
+              <a:t>Odabir tehnike</a:t>
+            </a:r>
+            <a:endParaRPr lang="en-US" sz="4800" dirty="0"/>
+          </a:p>
+        </p:txBody>
+      </p:sp>
+      <p:sp>
+        <p:nvSpPr>
+          <p:cNvPr id="5" name="Content Placeholder 4"/>
           <p:cNvSpPr>
             <a:spLocks noGrp="1"/>
           </p:cNvSpPr>
@@ -4234,12 +4292,160 @@
             <p:ph idx="1"/>
           </p:nvPr>
         </p:nvSpPr>
-        <p:spPr/>
-        <p:txBody>
-          <a:bodyPr/>
-          <a:lstStyle/>
-          <a:p>
-            <a:endParaRPr lang="en-US"/>
+        <p:spPr>
+          <a:xfrm>
+            <a:off x="457200" y="1935480"/>
+            <a:ext cx="8229600" cy="4770120"/>
+          </a:xfrm>
+        </p:spPr>
+        <p:txBody>
+          <a:bodyPr>
+            <a:normAutofit/>
+          </a:bodyPr>
+          <a:lstStyle/>
+          <a:p>
+            <a:r>
+              <a:rPr lang="sr-Latn-RS" dirty="0" smtClean="0">
+                <a:latin typeface="+mj-lt"/>
+              </a:rPr>
+              <a:t>Obzirom na to da posedujem određena znanja iz neuronskih mreža i njihovo korišćenje već implementarano u programskom jeziku python, iste su odabrane za rešavanje navedenog problema u ovom projektu.</a:t>
+            </a:r>
+            <a:endParaRPr lang="sr-Latn-RS" dirty="0" smtClean="0">
+              <a:latin typeface="+mj-lt"/>
+            </a:endParaRPr>
+          </a:p>
+          <a:p>
+            <a:r>
+              <a:rPr lang="sr-Latn-RS" dirty="0" smtClean="0">
+                <a:latin typeface="+mj-lt"/>
+              </a:rPr>
+              <a:t>Neće biti korišćene kombinacije komplikovanih neuronskih mreža koje daju impozantno mali procenat greške, međutim korišćene neuronske mreže u rešenju davaće sasvim zadovoljavajuću tačnost.</a:t>
+            </a:r>
+            <a:endParaRPr lang="en-US" dirty="0">
+              <a:latin typeface="+mj-lt"/>
+            </a:endParaRPr>
+          </a:p>
+        </p:txBody>
+      </p:sp>
+    </p:spTree>
+  </p:cSld>
+  <p:clrMapOvr>
+    <a:masterClrMapping/>
+  </p:clrMapOvr>
+</p:sld>
+</file>
+
+<file path=ppt/slides/slide12.xml><?xml version="1.0" encoding="utf-8"?>
+<p:sld xmlns:a="http://schemas.openxmlformats.org/drawingml/2006/main" xmlns:r="http://schemas.openxmlformats.org/officeDocument/2006/relationships" xmlns:p="http://schemas.openxmlformats.org/presentationml/2006/main">
+  <p:cSld>
+    <p:spTree>
+      <p:nvGrpSpPr>
+        <p:cNvPr id="1" name=""/>
+        <p:cNvGrpSpPr/>
+        <p:nvPr/>
+      </p:nvGrpSpPr>
+      <p:grpSpPr>
+        <a:xfrm>
+          <a:off x="0" y="0"/>
+          <a:ext cx="0" cy="0"/>
+          <a:chOff x="0" y="0"/>
+          <a:chExt cx="0" cy="0"/>
+        </a:xfrm>
+      </p:grpSpPr>
+      <p:sp>
+        <p:nvSpPr>
+          <p:cNvPr id="2" name="Title 1"/>
+          <p:cNvSpPr>
+            <a:spLocks noGrp="1"/>
+          </p:cNvSpPr>
+          <p:nvPr>
+            <p:ph type="title"/>
+          </p:nvPr>
+        </p:nvSpPr>
+        <p:spPr>
+          <a:xfrm>
+            <a:off x="457200" y="609600"/>
+            <a:ext cx="8229600" cy="932688"/>
+          </a:xfrm>
+        </p:spPr>
+        <p:txBody>
+          <a:bodyPr>
+            <a:normAutofit/>
+          </a:bodyPr>
+          <a:lstStyle/>
+          <a:p>
+            <a:pPr marL="514350" indent="-514350" algn="ctr"/>
+            <a:r>
+              <a:rPr lang="sr-Latn-RS" sz="4800" b="1" dirty="0" smtClean="0"/>
+              <a:t>Koraci implementacije</a:t>
+            </a:r>
+            <a:endParaRPr lang="en-US" sz="4800" dirty="0"/>
+          </a:p>
+        </p:txBody>
+      </p:sp>
+      <p:sp>
+        <p:nvSpPr>
+          <p:cNvPr id="5" name="Content Placeholder 4"/>
+          <p:cNvSpPr>
+            <a:spLocks noGrp="1"/>
+          </p:cNvSpPr>
+          <p:nvPr>
+            <p:ph idx="1"/>
+          </p:nvPr>
+        </p:nvSpPr>
+        <p:spPr>
+          <a:xfrm>
+            <a:off x="457200" y="1935480"/>
+            <a:ext cx="8229600" cy="4770120"/>
+          </a:xfrm>
+        </p:spPr>
+        <p:txBody>
+          <a:bodyPr>
+            <a:normAutofit/>
+          </a:bodyPr>
+          <a:lstStyle/>
+          <a:p>
+            <a:r>
+              <a:rPr lang="sr-Latn-RS" dirty="0" smtClean="0">
+                <a:latin typeface="+mj-lt"/>
+              </a:rPr>
+              <a:t>Priprema slike i podataka za ulaz u neuronsku mrežu.</a:t>
+            </a:r>
+          </a:p>
+          <a:p>
+            <a:r>
+              <a:rPr lang="sr-Latn-RS" dirty="0" smtClean="0">
+                <a:latin typeface="+mj-lt"/>
+              </a:rPr>
+              <a:t>Za učenje neuronske mreže koristi se MNIST set podataka.</a:t>
+            </a:r>
+            <a:endParaRPr lang="sr-Latn-RS" dirty="0" smtClean="0">
+              <a:latin typeface="+mj-lt"/>
+            </a:endParaRPr>
+          </a:p>
+          <a:p>
+            <a:r>
+              <a:rPr lang="sr-Latn-RS" dirty="0" smtClean="0">
+                <a:latin typeface="+mj-lt"/>
+              </a:rPr>
+              <a:t>Prepoznavanje cifara i ostalih potrebnih objekata za prepozavanje determinante.</a:t>
+            </a:r>
+          </a:p>
+          <a:p>
+            <a:r>
+              <a:rPr lang="sr-Latn-RS" dirty="0" smtClean="0">
+                <a:latin typeface="+mj-lt"/>
+              </a:rPr>
+              <a:t>Izračunavanje determinante.</a:t>
+            </a:r>
+          </a:p>
+          <a:p>
+            <a:r>
+              <a:rPr lang="sr-Latn-RS" dirty="0" smtClean="0">
+                <a:latin typeface="+mj-lt"/>
+              </a:rPr>
+              <a:t>Iscrtavanje rešenja live na ekranu tokom snimanja.</a:t>
+            </a:r>
           </a:p>
         </p:txBody>
       </p:sp>

</xml_diff>